<commit_message>
working on paper and talk
</commit_message>
<xml_diff>
--- a/Talks/EPS_Symposium_Naturalness.pptx
+++ b/Talks/EPS_Symposium_Naturalness.pptx
@@ -399,7 +399,7 @@
           <a:p>
             <a:fld id="{652642F8-4030-468B-846F-DE3B6AB6CE0D}" type="datetimeFigureOut">
               <a:rPr lang="de-DE" smtClean="0"/>
-              <a:t>11.04.2024</a:t>
+              <a:t>21.07.2024</a:t>
             </a:fld>
             <a:endParaRPr lang="de-DE"/>
           </a:p>
@@ -564,7 +564,7 @@
           <a:p>
             <a:fld id="{E1AB2040-EA4D-4002-BC41-13AC0377AF84}" type="datetimeFigureOut">
               <a:rPr lang="de-DE" smtClean="0"/>
-              <a:t>11.04.2024</a:t>
+              <a:t>21.07.2024</a:t>
             </a:fld>
             <a:endParaRPr lang="de-DE"/>
           </a:p>

</xml_diff>